<commit_message>
Couple more improvements--good version.
</commit_message>
<xml_diff>
--- a/ivey-powerpoint-template.pptx
+++ b/ivey-powerpoint-template.pptx
@@ -214,7 +214,7 @@
           <a:p>
             <a:fld id="{0F9C1CCF-B725-44A7-AA57-5E433BD85C9F}" type="datetimeFigureOut">
               <a:rPr lang="en-US" smtClean="0"/>
-              <a:t>11/24/2022</a:t>
+              <a:t>11/28/2022</a:t>
             </a:fld>
             <a:endParaRPr lang="en-US"/>
           </a:p>
@@ -1736,59 +1736,6 @@
           <a:chExt cx="0" cy="0"/>
         </a:xfrm>
       </p:grpSpPr>
-      <p:sp>
-        <p:nvSpPr>
-          <p:cNvPr id="13" name="Title 1">
-            <a:extLst>
-              <a:ext uri="{FF2B5EF4-FFF2-40B4-BE49-F238E27FC236}">
-                <a16:creationId xmlns:a16="http://schemas.microsoft.com/office/drawing/2014/main" id="{B8C56CC8-B39E-4F1E-857E-D694429B0B61}"/>
-              </a:ext>
-            </a:extLst>
-          </p:cNvPr>
-          <p:cNvSpPr>
-            <a:spLocks noGrp="1"/>
-          </p:cNvSpPr>
-          <p:nvPr>
-            <p:ph type="title"/>
-          </p:nvPr>
-        </p:nvSpPr>
-        <p:spPr>
-          <a:xfrm>
-            <a:off x="628650" y="273847"/>
-            <a:ext cx="7886700" cy="994172"/>
-          </a:xfrm>
-        </p:spPr>
-        <p:txBody>
-          <a:bodyPr anchor="t">
-            <a:normAutofit/>
-          </a:bodyPr>
-          <a:lstStyle>
-            <a:lvl1pPr algn="ctr" defTabSz="685663" rtl="0" eaLnBrk="1" latinLnBrk="0" hangingPunct="1">
-              <a:lnSpc>
-                <a:spcPct val="90000"/>
-              </a:lnSpc>
-              <a:spcBef>
-                <a:spcPct val="0"/>
-              </a:spcBef>
-              <a:buNone/>
-              <a:defRPr lang="en-US" sz="3300" kern="1200" dirty="0">
-                <a:solidFill>
-                  <a:schemeClr val="tx1"/>
-                </a:solidFill>
-                <a:latin typeface="Arial Bold" panose="020B0704020202020204" pitchFamily="34" charset="0"/>
-                <a:ea typeface="Arial" charset="0"/>
-                <a:cs typeface="Arial Bold" panose="020B0704020202020204" pitchFamily="34" charset="0"/>
-              </a:defRPr>
-            </a:lvl1pPr>
-          </a:lstStyle>
-          <a:p>
-            <a:r>
-              <a:rPr lang="en-US" dirty="0"/>
-              <a:t>Click to edit Master title style</a:t>
-            </a:r>
-          </a:p>
-        </p:txBody>
-      </p:sp>
       <p:cxnSp>
         <p:nvCxnSpPr>
           <p:cNvPr id="3" name="Straight Connector 2">
@@ -1850,8 +1797,8 @@
         </p:nvSpPr>
         <p:spPr>
           <a:xfrm>
-            <a:off x="4572000" y="1268018"/>
-            <a:ext cx="4267200" cy="3343275"/>
+            <a:off x="228600" y="1172054"/>
+            <a:ext cx="4343400" cy="3657600"/>
           </a:xfrm>
         </p:spPr>
         <p:txBody>
@@ -1860,38 +1807,38 @@
           <a:p>
             <a:pPr lvl="0"/>
             <a:r>
-              <a:rPr lang="en-US"/>
+              <a:rPr lang="en-US" dirty="0"/>
               <a:t>Click to edit Master text styles</a:t>
             </a:r>
           </a:p>
           <a:p>
             <a:pPr lvl="1"/>
             <a:r>
-              <a:rPr lang="en-US"/>
+              <a:rPr lang="en-US" dirty="0"/>
               <a:t>Second level</a:t>
             </a:r>
           </a:p>
           <a:p>
             <a:pPr lvl="2"/>
             <a:r>
-              <a:rPr lang="en-US"/>
+              <a:rPr lang="en-US" dirty="0"/>
               <a:t>Third level</a:t>
             </a:r>
           </a:p>
           <a:p>
             <a:pPr lvl="3"/>
             <a:r>
-              <a:rPr lang="en-US"/>
+              <a:rPr lang="en-US" dirty="0"/>
               <a:t>Fourth level</a:t>
             </a:r>
           </a:p>
           <a:p>
             <a:pPr lvl="4"/>
             <a:r>
-              <a:rPr lang="en-US"/>
+              <a:rPr lang="en-US" dirty="0"/>
               <a:t>Fifth level</a:t>
             </a:r>
-            <a:endParaRPr lang="en-CA"/>
+            <a:endParaRPr lang="en-CA" dirty="0"/>
           </a:p>
         </p:txBody>
       </p:sp>
@@ -1913,8 +1860,8 @@
         </p:nvSpPr>
         <p:spPr>
           <a:xfrm>
-            <a:off x="304800" y="1268019"/>
-            <a:ext cx="4267200" cy="3343275"/>
+            <a:off x="4572000" y="1167531"/>
+            <a:ext cx="4343400" cy="3657600"/>
           </a:xfrm>
         </p:spPr>
         <p:txBody>
@@ -1923,38 +1870,82 @@
           <a:p>
             <a:pPr lvl="0"/>
             <a:r>
-              <a:rPr lang="en-US"/>
+              <a:rPr lang="en-US" dirty="0"/>
               <a:t>Click to edit Master text styles</a:t>
             </a:r>
           </a:p>
           <a:p>
             <a:pPr lvl="1"/>
             <a:r>
-              <a:rPr lang="en-US"/>
+              <a:rPr lang="en-US" dirty="0"/>
               <a:t>Second level</a:t>
             </a:r>
           </a:p>
           <a:p>
             <a:pPr lvl="2"/>
             <a:r>
-              <a:rPr lang="en-US"/>
+              <a:rPr lang="en-US" dirty="0"/>
               <a:t>Third level</a:t>
             </a:r>
           </a:p>
           <a:p>
             <a:pPr lvl="3"/>
             <a:r>
-              <a:rPr lang="en-US"/>
+              <a:rPr lang="en-US" dirty="0"/>
               <a:t>Fourth level</a:t>
             </a:r>
           </a:p>
           <a:p>
             <a:pPr lvl="4"/>
             <a:r>
-              <a:rPr lang="en-US"/>
+              <a:rPr lang="en-US" dirty="0"/>
               <a:t>Fifth level</a:t>
             </a:r>
-            <a:endParaRPr lang="en-CA"/>
+            <a:endParaRPr lang="en-CA" dirty="0"/>
+          </a:p>
+        </p:txBody>
+      </p:sp>
+      <p:sp>
+        <p:nvSpPr>
+          <p:cNvPr id="6" name="Title 1">
+            <a:extLst>
+              <a:ext uri="{FF2B5EF4-FFF2-40B4-BE49-F238E27FC236}">
+                <a16:creationId xmlns:a16="http://schemas.microsoft.com/office/drawing/2014/main" id="{B7AD5B1E-D731-4A8A-B3FC-77CB8AF444FE}"/>
+              </a:ext>
+            </a:extLst>
+          </p:cNvPr>
+          <p:cNvSpPr>
+            <a:spLocks noGrp="1"/>
+          </p:cNvSpPr>
+          <p:nvPr>
+            <p:ph type="title"/>
+          </p:nvPr>
+        </p:nvSpPr>
+        <p:spPr>
+          <a:xfrm>
+            <a:off x="628650" y="196126"/>
+            <a:ext cx="7886700" cy="994172"/>
+          </a:xfrm>
+        </p:spPr>
+        <p:txBody>
+          <a:bodyPr anchor="t"/>
+          <a:lstStyle>
+            <a:lvl1pPr algn="ctr">
+              <a:defRPr lang="en-US" sz="3300" kern="1200" dirty="0">
+                <a:solidFill>
+                  <a:schemeClr val="tx1"/>
+                </a:solidFill>
+                <a:latin typeface="Arial Bold" panose="020B0704020202020204" pitchFamily="34" charset="0"/>
+                <a:ea typeface="Arial" charset="0"/>
+                <a:cs typeface="Arial Bold" panose="020B0704020202020204" pitchFamily="34" charset="0"/>
+              </a:defRPr>
+            </a:lvl1pPr>
+          </a:lstStyle>
+          <a:p>
+            <a:r>
+              <a:rPr lang="en-US" dirty="0"/>
+              <a:t>Click to edit Master title style</a:t>
+            </a:r>
           </a:p>
         </p:txBody>
       </p:sp>
@@ -1970,7 +1961,7 @@
   </p:clrMapOvr>
   <mc:AlternateContent xmlns:mc="http://schemas.openxmlformats.org/markup-compatibility/2006" xmlns:p14="http://schemas.microsoft.com/office/powerpoint/2010/main">
     <mc:Choice Requires="p14">
-      <p:transition p14:dur="0" advClick="0"/>
+      <p:transition p14:dur="10" advClick="0"/>
     </mc:Choice>
     <mc:Fallback xmlns="">
       <p:transition advClick="0"/>
@@ -3109,7 +3100,7 @@
         </p:nvSpPr>
         <p:spPr>
           <a:xfrm>
-            <a:off x="628650" y="273847"/>
+            <a:off x="628650" y="196126"/>
             <a:ext cx="7886700" cy="994172"/>
           </a:xfrm>
           <a:prstGeom prst="rect">
@@ -3141,8 +3132,8 @@
         </p:nvSpPr>
         <p:spPr>
           <a:xfrm>
-            <a:off x="628650" y="1369219"/>
-            <a:ext cx="7886700" cy="3263504"/>
+            <a:off x="457200" y="1188264"/>
+            <a:ext cx="8229600" cy="3657600"/>
           </a:xfrm>
           <a:prstGeom prst="rect">
             <a:avLst/>
@@ -3505,7 +3496,7 @@
           <a:cs typeface="Arial" charset="0"/>
         </a:defRPr>
       </a:lvl1pPr>
-      <a:lvl2pPr marL="514247" indent="-171416" algn="l" defTabSz="685663" rtl="0" eaLnBrk="1" latinLnBrk="0" hangingPunct="1">
+      <a:lvl2pPr marL="169863" indent="-169863" algn="l" defTabSz="685663" rtl="0" eaLnBrk="1" latinLnBrk="0" hangingPunct="1">
         <a:lnSpc>
           <a:spcPct val="90000"/>
         </a:lnSpc>
@@ -3524,7 +3515,7 @@
           <a:cs typeface="Arial" charset="0"/>
         </a:defRPr>
       </a:lvl2pPr>
-      <a:lvl3pPr marL="857079" indent="-171416" algn="l" defTabSz="685663" rtl="0" eaLnBrk="1" latinLnBrk="0" hangingPunct="1">
+      <a:lvl3pPr marL="400050" indent="-169863" algn="l" defTabSz="685663" rtl="0" eaLnBrk="1" latinLnBrk="0" hangingPunct="1">
         <a:lnSpc>
           <a:spcPct val="90000"/>
         </a:lnSpc>
@@ -3532,7 +3523,7 @@
           <a:spcPts val="375"/>
         </a:spcBef>
         <a:buFont typeface="Arial" panose="020B0604020202020204" pitchFamily="34" charset="0"/>
-        <a:buChar char="•"/>
+        <a:buChar char="-"/>
         <a:defRPr lang="en-US" sz="1600" kern="1200" dirty="0" smtClean="0">
           <a:solidFill>
             <a:schemeClr val="tx1"/>
@@ -3543,7 +3534,7 @@
           <a:cs typeface="Arial" charset="0"/>
         </a:defRPr>
       </a:lvl3pPr>
-      <a:lvl4pPr marL="1199910" indent="-171416" algn="l" defTabSz="685663" rtl="0" eaLnBrk="1" latinLnBrk="0" hangingPunct="1">
+      <a:lvl4pPr marL="628650" indent="-169863" algn="l" defTabSz="685663" rtl="0" eaLnBrk="1" latinLnBrk="0" hangingPunct="1">
         <a:lnSpc>
           <a:spcPct val="90000"/>
         </a:lnSpc>
@@ -3562,7 +3553,7 @@
           <a:cs typeface="Arial" charset="0"/>
         </a:defRPr>
       </a:lvl4pPr>
-      <a:lvl5pPr marL="1542741" indent="-171416" algn="l" defTabSz="685663" rtl="0" eaLnBrk="1" latinLnBrk="0" hangingPunct="1">
+      <a:lvl5pPr marL="857250" indent="-169863" algn="l" defTabSz="685663" rtl="0" eaLnBrk="1" latinLnBrk="0" hangingPunct="1">
         <a:lnSpc>
           <a:spcPct val="90000"/>
         </a:lnSpc>
@@ -3570,7 +3561,7 @@
           <a:spcPts val="375"/>
         </a:spcBef>
         <a:buFont typeface="Arial" panose="020B0604020202020204" pitchFamily="34" charset="0"/>
-        <a:buChar char="•"/>
+        <a:buChar char="-"/>
         <a:defRPr lang="en-US" sz="1600" kern="1200" dirty="0">
           <a:solidFill>
             <a:schemeClr val="tx1"/>
@@ -4035,12 +4026,12 @@
       </p:grpSpPr>
       <p:sp>
         <p:nvSpPr>
-          <p:cNvPr id="4" name="Title 3"/>
-          <p:cNvSpPr>
-            <a:spLocks noGrp="1"/>
-          </p:cNvSpPr>
-          <p:nvPr>
-            <p:ph type="title"/>
+          <p:cNvPr id="5" name="Content Placeholder 4"/>
+          <p:cNvSpPr>
+            <a:spLocks noGrp="1"/>
+          </p:cNvSpPr>
+          <p:nvPr>
+            <p:ph sz="quarter" idx="11"/>
           </p:nvPr>
         </p:nvSpPr>
         <p:spPr/>
@@ -4050,67 +4041,57 @@
           <a:p>
             <a:r>
               <a:rPr lang="en-US" dirty="0"/>
-              <a:t>Slide Title for Two-Content</a:t>
-            </a:r>
-          </a:p>
-        </p:txBody>
-      </p:sp>
-      <p:sp>
-        <p:nvSpPr>
-          <p:cNvPr id="5" name="Content Placeholder 4"/>
-          <p:cNvSpPr>
-            <a:spLocks noGrp="1"/>
-          </p:cNvSpPr>
-          <p:nvPr>
-            <p:ph type="body" sz="quarter" idx="4294967295"/>
-          </p:nvPr>
-        </p:nvSpPr>
-        <p:spPr>
-          <a:xfrm>
-            <a:off x="228600" y="1200150"/>
-            <a:ext cx="4419600" cy="3343276"/>
-          </a:xfrm>
-        </p:spPr>
+              <a:t>Some content on the left.</a:t>
+            </a:r>
+          </a:p>
+          <a:p>
+            <a:pPr marL="0" indent="0">
+              <a:buNone/>
+            </a:pPr>
+            <a:endParaRPr lang="en-US" dirty="0"/>
+          </a:p>
+        </p:txBody>
+      </p:sp>
+      <p:sp>
+        <p:nvSpPr>
+          <p:cNvPr id="6" name="Content Placeholder 5"/>
+          <p:cNvSpPr>
+            <a:spLocks noGrp="1"/>
+          </p:cNvSpPr>
+          <p:nvPr>
+            <p:ph sz="quarter" idx="12"/>
+          </p:nvPr>
+        </p:nvSpPr>
+        <p:spPr/>
         <p:txBody>
           <a:bodyPr/>
           <a:lstStyle/>
           <a:p>
             <a:r>
               <a:rPr lang="en-US" dirty="0"/>
-              <a:t>Some content on the left.</a:t>
-            </a:r>
-          </a:p>
-          <a:p>
-            <a:pPr marL="0" indent="0">
-              <a:buNone/>
-            </a:pPr>
-            <a:endParaRPr lang="en-US" dirty="0"/>
-          </a:p>
-        </p:txBody>
-      </p:sp>
-      <p:sp>
-        <p:nvSpPr>
-          <p:cNvPr id="6" name="Content Placeholder 5"/>
-          <p:cNvSpPr>
-            <a:spLocks noGrp="1"/>
-          </p:cNvSpPr>
-          <p:nvPr>
-            <p:ph type="body" sz="quarter" idx="4294967295"/>
-          </p:nvPr>
-        </p:nvSpPr>
-        <p:spPr>
-          <a:xfrm>
-            <a:off x="4648200" y="1200150"/>
-            <a:ext cx="4419600" cy="3343275"/>
-          </a:xfrm>
-        </p:spPr>
+              <a:t>Some content on the right.</a:t>
+            </a:r>
+          </a:p>
+        </p:txBody>
+      </p:sp>
+      <p:sp>
+        <p:nvSpPr>
+          <p:cNvPr id="4" name="Title 3"/>
+          <p:cNvSpPr>
+            <a:spLocks noGrp="1"/>
+          </p:cNvSpPr>
+          <p:nvPr>
+            <p:ph type="title"/>
+          </p:nvPr>
+        </p:nvSpPr>
+        <p:spPr/>
         <p:txBody>
           <a:bodyPr/>
           <a:lstStyle/>
           <a:p>
             <a:r>
               <a:rPr lang="en-US" dirty="0"/>
-              <a:t>Some content on the right.</a:t>
+              <a:t>Slide Title for Two-Content</a:t>
             </a:r>
           </a:p>
         </p:txBody>

</xml_diff>

<commit_message>
Fixed page number text box too small.
</commit_message>
<xml_diff>
--- a/ivey-powerpoint-template.pptx
+++ b/ivey-powerpoint-template.pptx
@@ -214,7 +214,7 @@
           <a:p>
             <a:fld id="{0F9C1CCF-B725-44A7-AA57-5E433BD85C9F}" type="datetimeFigureOut">
               <a:rPr lang="en-US" smtClean="0"/>
-              <a:t>12/12/2022</a:t>
+              <a:t>12/16/2022</a:t>
             </a:fld>
             <a:endParaRPr lang="en-US"/>
           </a:p>
@@ -3772,8 +3772,8 @@
         </p:nvSpPr>
         <p:spPr>
           <a:xfrm>
-            <a:off x="8668183" y="227651"/>
-            <a:ext cx="303555" cy="230806"/>
+            <a:off x="8637700" y="227651"/>
+            <a:ext cx="353640" cy="230806"/>
           </a:xfrm>
           <a:prstGeom prst="rect">
             <a:avLst/>
@@ -3781,7 +3781,7 @@
           <a:noFill/>
         </p:spPr>
         <p:txBody>
-          <a:bodyPr wrap="none" lIns="68553" tIns="34277" rIns="68553" bIns="34277" rtlCol="0">
+          <a:bodyPr wrap="square" lIns="68553" tIns="34277" rIns="68553" bIns="34277" rtlCol="0">
             <a:spAutoFit/>
           </a:bodyPr>
           <a:lstStyle/>

</xml_diff>